<commit_message>
changes to the pp.
</commit_message>
<xml_diff>
--- a/NU-Project2FormulaOne (1).pptx
+++ b/NU-Project2FormulaOne (1).pptx
@@ -5132,8 +5132,25 @@
                 <a:effectLst/>
                 <a:latin typeface="Arial" panose="020B0604020202020204" pitchFamily="34" charset="0"/>
               </a:rPr>
-              <a:t>Dashboard – Jordan, Christine</a:t>
-            </a:r>
+              <a:t>Dashboard </a:t>
+            </a:r>
+            <a:r>
+              <a:rPr lang="en-US" sz="2400" b="0" i="0" u="none" strike="noStrike">
+                <a:solidFill>
+                  <a:srgbClr val="000000"/>
+                </a:solidFill>
+                <a:effectLst/>
+                <a:latin typeface="Arial" panose="020B0604020202020204" pitchFamily="34" charset="0"/>
+              </a:rPr>
+              <a:t>– Jordan</a:t>
+            </a:r>
+            <a:endParaRPr lang="en-US" sz="2400" b="0" i="0" u="none" strike="noStrike" dirty="0">
+              <a:solidFill>
+                <a:srgbClr val="000000"/>
+              </a:solidFill>
+              <a:effectLst/>
+              <a:latin typeface="Arial" panose="020B0604020202020204" pitchFamily="34" charset="0"/>
+            </a:endParaRPr>
           </a:p>
           <a:p>
             <a:pPr marL="342900" indent="-342900" rtl="0" fontAlgn="base">
@@ -6114,7 +6131,12 @@
             <p:ph type="title"/>
           </p:nvPr>
         </p:nvSpPr>
-        <p:spPr/>
+        <p:spPr>
+          <a:xfrm>
+            <a:off x="408355" y="2047010"/>
+            <a:ext cx="8229600" cy="857250"/>
+          </a:xfrm>
+        </p:spPr>
         <p:txBody>
           <a:bodyPr/>
           <a:lstStyle/>
@@ -6166,7 +6188,12 @@
             <p:ph idx="1"/>
           </p:nvPr>
         </p:nvSpPr>
-        <p:spPr/>
+        <p:spPr>
+          <a:xfrm>
+            <a:off x="457200" y="2904260"/>
+            <a:ext cx="8229600" cy="1700991"/>
+          </a:xfrm>
+        </p:spPr>
         <p:txBody>
           <a:bodyPr>
             <a:normAutofit/>
@@ -6240,6 +6267,36 @@
           </a:p>
         </p:txBody>
       </p:sp>
+      <p:pic>
+        <p:nvPicPr>
+          <p:cNvPr id="3" name="Picture 2">
+            <a:extLst>
+              <a:ext uri="{FF2B5EF4-FFF2-40B4-BE49-F238E27FC236}">
+                <a16:creationId xmlns:a16="http://schemas.microsoft.com/office/drawing/2014/main" id="{E0FD91F1-B958-FC4F-9063-776F6BC76C1C}"/>
+              </a:ext>
+            </a:extLst>
+          </p:cNvPr>
+          <p:cNvPicPr>
+            <a:picLocks noChangeAspect="1"/>
+          </p:cNvPicPr>
+          <p:nvPr/>
+        </p:nvPicPr>
+        <p:blipFill>
+          <a:blip r:embed="rId2"/>
+          <a:stretch>
+            <a:fillRect/>
+          </a:stretch>
+        </p:blipFill>
+        <p:spPr>
+          <a:xfrm>
+            <a:off x="2560781" y="227735"/>
+            <a:ext cx="3790143" cy="1966825"/>
+          </a:xfrm>
+          <a:prstGeom prst="rect">
+            <a:avLst/>
+          </a:prstGeom>
+        </p:spPr>
+      </p:pic>
     </p:spTree>
     <p:extLst>
       <p:ext uri="{BB962C8B-B14F-4D97-AF65-F5344CB8AC3E}">
@@ -6288,8 +6345,8 @@
         </p:nvSpPr>
         <p:spPr>
           <a:xfrm>
-            <a:off x="2781407" y="2060972"/>
-            <a:ext cx="7772400" cy="1021556"/>
+            <a:off x="1977043" y="2642863"/>
+            <a:ext cx="4342600" cy="1021556"/>
           </a:xfrm>
         </p:spPr>
         <p:txBody>
@@ -6333,6 +6390,36 @@
           </a:p>
         </p:txBody>
       </p:sp>
+      <p:pic>
+        <p:nvPicPr>
+          <p:cNvPr id="3" name="Picture 2">
+            <a:extLst>
+              <a:ext uri="{FF2B5EF4-FFF2-40B4-BE49-F238E27FC236}">
+                <a16:creationId xmlns:a16="http://schemas.microsoft.com/office/drawing/2014/main" id="{13B2E1CC-1832-754F-A343-3C00A478766C}"/>
+              </a:ext>
+            </a:extLst>
+          </p:cNvPr>
+          <p:cNvPicPr>
+            <a:picLocks noChangeAspect="1"/>
+          </p:cNvPicPr>
+          <p:nvPr/>
+        </p:nvPicPr>
+        <p:blipFill>
+          <a:blip r:embed="rId2"/>
+          <a:stretch>
+            <a:fillRect/>
+          </a:stretch>
+        </p:blipFill>
+        <p:spPr>
+          <a:xfrm>
+            <a:off x="1977043" y="0"/>
+            <a:ext cx="3810000" cy="2133600"/>
+          </a:xfrm>
+          <a:prstGeom prst="rect">
+            <a:avLst/>
+          </a:prstGeom>
+        </p:spPr>
+      </p:pic>
     </p:spTree>
     <p:extLst>
       <p:ext uri="{BB962C8B-B14F-4D97-AF65-F5344CB8AC3E}">

</xml_diff>